<commit_message>
Minor changes to introduction slides
</commit_message>
<xml_diff>
--- a/lectures/01-introduction.pptx
+++ b/lectures/01-introduction.pptx
@@ -5355,13 +5355,8 @@
             </a:r>
             <a:r>
               <a:rPr lang="en-US" dirty="0"/>
-              <a:t> </a:t>
-            </a:r>
-            <a:r>
-              <a:rPr lang="en-US"/>
-              <a:t>apocalypse survivor</a:t>
-            </a:r>
-            <a:endParaRPr lang="en-US" dirty="0"/>
+              <a:t> apocalypse survivor</a:t>
+            </a:r>
           </a:p>
         </p:txBody>
       </p:sp>
@@ -7247,25 +7242,6 @@
       </p:grpSpPr>
       <p:sp>
         <p:nvSpPr>
-          <p:cNvPr id="5" name="Title 4"/>
-          <p:cNvSpPr>
-            <a:spLocks noGrp="1"/>
-          </p:cNvSpPr>
-          <p:nvPr>
-            <p:ph type="title"/>
-          </p:nvPr>
-        </p:nvSpPr>
-        <p:spPr/>
-        <p:txBody>
-          <a:bodyPr/>
-          <a:lstStyle/>
-          <a:p>
-            <a:endParaRPr lang="en-US" dirty="0"/>
-          </a:p>
-        </p:txBody>
-      </p:sp>
-      <p:sp>
-        <p:nvSpPr>
           <p:cNvPr id="6" name="Content Placeholder 5"/>
           <p:cNvSpPr>
             <a:spLocks noGrp="1"/>
@@ -7306,7 +7282,7 @@
             </a:r>
             <a:r>
               <a:rPr lang="en-US" dirty="0"/>
-              <a:t> for many different types of devices</a:t>
+              <a:t> for many different types of devices…</a:t>
             </a:r>
           </a:p>
           <a:p>
@@ -7314,6 +7290,12 @@
             <a:r>
               <a:rPr lang="en-US" dirty="0"/>
               <a:t>Differing requirements (functionality, footprint, real-time)</a:t>
+            </a:r>
+          </a:p>
+          <a:p>
+            <a:r>
+              <a:rPr lang="en-US" dirty="0"/>
+              <a:t>… and applications</a:t>
             </a:r>
           </a:p>
           <a:p>

</xml_diff>